<commit_message>
Slide for inelastic data reduction
</commit_message>
<xml_diff>
--- a/doc/2020_SuperresolutionISIS.pptx
+++ b/doc/2020_SuperresolutionISIS.pptx
@@ -3490,7 +3490,7 @@
             <a:graphicData uri="http://schemas.openxmlformats.org/presentationml/2006/ole">
               <mc:AlternateContent xmlns:mc="http://schemas.openxmlformats.org/markup-compatibility/2006">
                 <mc:Choice xmlns:v="urn:schemas-microsoft-com:vml" Requires="v">
-                  <p:oleObj spid="_x0000_s1064" name="Equation" r:id="rId6" imgW="4140000" imgH="457200" progId="Equation.DSMT4">
+                  <p:oleObj spid="_x0000_s1067" name="Equation" r:id="rId6" imgW="4140000" imgH="457200" progId="Equation.DSMT4">
                     <p:embed/>
                   </p:oleObj>
                 </mc:Choice>
@@ -4798,7 +4798,7 @@
           <a:graphicData uri="http://schemas.openxmlformats.org/presentationml/2006/ole">
             <mc:AlternateContent xmlns:mc="http://schemas.openxmlformats.org/markup-compatibility/2006">
               <mc:Choice xmlns:v="urn:schemas-microsoft-com:vml" Requires="v">
-                <p:oleObj spid="_x0000_s2102" name="Equation" r:id="rId3" imgW="114120" imgH="177480" progId="Equation.DSMT4">
+                <p:oleObj spid="_x0000_s2108" name="Equation" r:id="rId3" imgW="114120" imgH="177480" progId="Equation.DSMT4">
                   <p:embed/>
                 </p:oleObj>
               </mc:Choice>
@@ -4855,7 +4855,7 @@
           <a:graphicData uri="http://schemas.openxmlformats.org/presentationml/2006/ole">
             <mc:AlternateContent xmlns:mc="http://schemas.openxmlformats.org/markup-compatibility/2006">
               <mc:Choice xmlns:v="urn:schemas-microsoft-com:vml" Requires="v">
-                <p:oleObj spid="_x0000_s2103" name="Equation" r:id="rId5" imgW="2209680" imgH="279360" progId="Equation.DSMT4">
+                <p:oleObj spid="_x0000_s2109" name="Equation" r:id="rId5" imgW="2209680" imgH="279360" progId="Equation.DSMT4">
                   <p:embed/>
                 </p:oleObj>
               </mc:Choice>
@@ -5722,7 +5722,7 @@
           <a:graphicData uri="http://schemas.openxmlformats.org/presentationml/2006/ole">
             <mc:AlternateContent xmlns:mc="http://schemas.openxmlformats.org/markup-compatibility/2006">
               <mc:Choice xmlns:v="urn:schemas-microsoft-com:vml" Requires="v">
-                <p:oleObj spid="_x0000_s3107" name="Equation" r:id="rId4" imgW="2209680" imgH="279360" progId="Equation.DSMT4">
+                <p:oleObj spid="_x0000_s3116" name="Equation" r:id="rId4" imgW="2209680" imgH="279360" progId="Equation.DSMT4">
                   <p:embed/>
                 </p:oleObj>
               </mc:Choice>
@@ -5779,7 +5779,7 @@
           <a:graphicData uri="http://schemas.openxmlformats.org/presentationml/2006/ole">
             <mc:AlternateContent xmlns:mc="http://schemas.openxmlformats.org/markup-compatibility/2006">
               <mc:Choice xmlns:v="urn:schemas-microsoft-com:vml" Requires="v">
-                <p:oleObj spid="_x0000_s3108" name="Equation" r:id="rId6" imgW="2908080" imgH="469800" progId="Equation.DSMT4">
+                <p:oleObj spid="_x0000_s3117" name="Equation" r:id="rId6" imgW="2908080" imgH="469800" progId="Equation.DSMT4">
                   <p:embed/>
                 </p:oleObj>
               </mc:Choice>
@@ -5942,7 +5942,7 @@
           <a:graphicData uri="http://schemas.openxmlformats.org/presentationml/2006/ole">
             <mc:AlternateContent xmlns:mc="http://schemas.openxmlformats.org/markup-compatibility/2006">
               <mc:Choice xmlns:v="urn:schemas-microsoft-com:vml" Requires="v">
-                <p:oleObj spid="_x0000_s3109" name="Equation" r:id="rId8" imgW="583920" imgH="215640" progId="Equation.DSMT4">
+                <p:oleObj spid="_x0000_s3118" name="Equation" r:id="rId8" imgW="583920" imgH="215640" progId="Equation.DSMT4">
                   <p:embed/>
                 </p:oleObj>
               </mc:Choice>
@@ -6215,10 +6215,223 @@
           <a:p>
             <a:r>
               <a:rPr lang="en-GB" dirty="0" smtClean="0"/>
-              <a:t>is seems here)</a:t>
-            </a:r>
-          </a:p>
-          <a:p>
+              <a:t>Is, seems</a:t>
+            </a:r>
+            <a:r>
+              <a:rPr lang="en-GB" smtClean="0"/>
+              <a:t>, ready)</a:t>
+            </a:r>
+            <a:endParaRPr lang="en-GB" dirty="0" smtClean="0"/>
+          </a:p>
+          <a:p>
+            <a:endParaRPr lang="en-GB" dirty="0"/>
+          </a:p>
+        </p:txBody>
+      </p:sp>
+      <p:sp>
+        <p:nvSpPr>
+          <p:cNvPr id="13" name="Left-Right Arrow 12"/>
+          <p:cNvSpPr/>
+          <p:nvPr/>
+        </p:nvSpPr>
+        <p:spPr>
+          <a:xfrm>
+            <a:off x="6952795" y="2698172"/>
+            <a:ext cx="1240970" cy="352697"/>
+          </a:xfrm>
+          <a:prstGeom prst="leftRightArrow">
+            <a:avLst/>
+          </a:prstGeom>
+        </p:spPr>
+        <p:style>
+          <a:lnRef idx="2">
+            <a:schemeClr val="accent1">
+              <a:shade val="50000"/>
+            </a:schemeClr>
+          </a:lnRef>
+          <a:fillRef idx="1">
+            <a:schemeClr val="accent1"/>
+          </a:fillRef>
+          <a:effectRef idx="0">
+            <a:schemeClr val="accent1"/>
+          </a:effectRef>
+          <a:fontRef idx="minor">
+            <a:schemeClr val="lt1"/>
+          </a:fontRef>
+        </p:style>
+        <p:txBody>
+          <a:bodyPr rtlCol="0" anchor="ctr"/>
+          <a:lstStyle/>
+          <a:p>
+            <a:pPr algn="ctr"/>
+            <a:endParaRPr lang="en-GB"/>
+          </a:p>
+        </p:txBody>
+      </p:sp>
+      <p:sp>
+        <p:nvSpPr>
+          <p:cNvPr id="14" name="Left-Right Arrow 13"/>
+          <p:cNvSpPr/>
+          <p:nvPr/>
+        </p:nvSpPr>
+        <p:spPr>
+          <a:xfrm>
+            <a:off x="7066006" y="4849193"/>
+            <a:ext cx="1240970" cy="352697"/>
+          </a:xfrm>
+          <a:prstGeom prst="leftRightArrow">
+            <a:avLst/>
+          </a:prstGeom>
+        </p:spPr>
+        <p:style>
+          <a:lnRef idx="2">
+            <a:schemeClr val="accent1">
+              <a:shade val="50000"/>
+            </a:schemeClr>
+          </a:lnRef>
+          <a:fillRef idx="1">
+            <a:schemeClr val="accent1"/>
+          </a:fillRef>
+          <a:effectRef idx="0">
+            <a:schemeClr val="accent1"/>
+          </a:effectRef>
+          <a:fontRef idx="minor">
+            <a:schemeClr val="lt1"/>
+          </a:fontRef>
+        </p:style>
+        <p:txBody>
+          <a:bodyPr rtlCol="0" anchor="ctr"/>
+          <a:lstStyle/>
+          <a:p>
+            <a:pPr algn="ctr"/>
+            <a:endParaRPr lang="en-GB"/>
+          </a:p>
+        </p:txBody>
+      </p:sp>
+      <p:sp>
+        <p:nvSpPr>
+          <p:cNvPr id="15" name="TextBox 14"/>
+          <p:cNvSpPr txBox="1"/>
+          <p:nvPr/>
+        </p:nvSpPr>
+        <p:spPr>
+          <a:xfrm>
+            <a:off x="4695502" y="1517177"/>
+            <a:ext cx="3187539" cy="369332"/>
+          </a:xfrm>
+          <a:prstGeom prst="rect">
+            <a:avLst/>
+          </a:prstGeom>
+          <a:noFill/>
+        </p:spPr>
+        <p:txBody>
+          <a:bodyPr wrap="none" rtlCol="0">
+            <a:spAutoFit/>
+          </a:bodyPr>
+          <a:lstStyle/>
+          <a:p>
+            <a:r>
+              <a:rPr lang="en-GB" dirty="0" smtClean="0"/>
+              <a:t>Model </a:t>
+            </a:r>
+            <a:r>
+              <a:rPr lang="en-GB" dirty="0" err="1" smtClean="0"/>
+              <a:t>Signal+noise</a:t>
+            </a:r>
+            <a:r>
+              <a:rPr lang="en-GB" dirty="0" smtClean="0"/>
+              <a:t> on Detector</a:t>
+            </a:r>
+            <a:endParaRPr lang="en-GB" dirty="0"/>
+          </a:p>
+        </p:txBody>
+      </p:sp>
+      <p:sp>
+        <p:nvSpPr>
+          <p:cNvPr id="16" name="TextBox 15"/>
+          <p:cNvSpPr txBox="1"/>
+          <p:nvPr/>
+        </p:nvSpPr>
+        <p:spPr>
+          <a:xfrm>
+            <a:off x="8420607" y="1578966"/>
+            <a:ext cx="2391617" cy="369332"/>
+          </a:xfrm>
+          <a:prstGeom prst="rect">
+            <a:avLst/>
+          </a:prstGeom>
+          <a:noFill/>
+        </p:spPr>
+        <p:txBody>
+          <a:bodyPr wrap="none" rtlCol="0">
+            <a:spAutoFit/>
+          </a:bodyPr>
+          <a:lstStyle/>
+          <a:p>
+            <a:r>
+              <a:rPr lang="en-GB" dirty="0" smtClean="0"/>
+              <a:t>Recovered distribution</a:t>
+            </a:r>
+            <a:endParaRPr lang="en-GB" dirty="0"/>
+          </a:p>
+        </p:txBody>
+      </p:sp>
+      <p:sp>
+        <p:nvSpPr>
+          <p:cNvPr id="17" name="TextBox 16"/>
+          <p:cNvSpPr txBox="1"/>
+          <p:nvPr/>
+        </p:nvSpPr>
+        <p:spPr>
+          <a:xfrm>
+            <a:off x="5639734" y="6198219"/>
+            <a:ext cx="649537" cy="369332"/>
+          </a:xfrm>
+          <a:prstGeom prst="rect">
+            <a:avLst/>
+          </a:prstGeom>
+          <a:noFill/>
+        </p:spPr>
+        <p:txBody>
+          <a:bodyPr wrap="none" rtlCol="0">
+            <a:spAutoFit/>
+          </a:bodyPr>
+          <a:lstStyle/>
+          <a:p>
+            <a:r>
+              <a:rPr lang="en-GB" dirty="0" smtClean="0"/>
+              <a:t>Time</a:t>
+            </a:r>
+            <a:endParaRPr lang="en-GB" dirty="0"/>
+          </a:p>
+        </p:txBody>
+      </p:sp>
+      <p:sp>
+        <p:nvSpPr>
+          <p:cNvPr id="18" name="TextBox 17"/>
+          <p:cNvSpPr txBox="1"/>
+          <p:nvPr/>
+        </p:nvSpPr>
+        <p:spPr>
+          <a:xfrm>
+            <a:off x="8760283" y="6198219"/>
+            <a:ext cx="1712264" cy="369332"/>
+          </a:xfrm>
+          <a:prstGeom prst="rect">
+            <a:avLst/>
+          </a:prstGeom>
+          <a:noFill/>
+        </p:spPr>
+        <p:txBody>
+          <a:bodyPr wrap="none" rtlCol="0">
+            <a:spAutoFit/>
+          </a:bodyPr>
+          <a:lstStyle/>
+          <a:p>
+            <a:r>
+              <a:rPr lang="en-GB" dirty="0" smtClean="0"/>
+              <a:t>Velocity transfer</a:t>
+            </a:r>
             <a:endParaRPr lang="en-GB" dirty="0"/>
           </a:p>
         </p:txBody>

</xml_diff>